<commit_message>
atualização diaria, resolvido problema na leitura da serial
</commit_message>
<xml_diff>
--- a/TCC.pptx
+++ b/TCC.pptx
@@ -124,6 +124,11 @@
       </a:defRPr>
     </a:lvl9pPr>
   </p:defaultTextStyle>
+  <p:extLst>
+    <p:ext uri="{EFAFB233-063F-42B5-8137-9DF3F51BA10A}">
+      <p15:sldGuideLst xmlns:p15="http://schemas.microsoft.com/office/powerpoint/2012/main"/>
+    </p:ext>
+  </p:extLst>
 </p:presentation>
 </file>
 
@@ -204,6 +209,11 @@
               </a:ln>
               <a:effectLst/>
             </c:spPr>
+            <c:extLst>
+              <c:ext xmlns:c16="http://schemas.microsoft.com/office/drawing/2014/chart" uri="{C3380CC4-5D6E-409C-BE32-E72D297353CC}">
+                <c16:uniqueId val="{00000001-E0A5-4ACF-A496-5C1F173A8A34}"/>
+              </c:ext>
+            </c:extLst>
           </c:dPt>
           <c:dPt>
             <c:idx val="1"/>
@@ -219,6 +229,11 @@
               </a:ln>
               <a:effectLst/>
             </c:spPr>
+            <c:extLst>
+              <c:ext xmlns:c16="http://schemas.microsoft.com/office/drawing/2014/chart" uri="{C3380CC4-5D6E-409C-BE32-E72D297353CC}">
+                <c16:uniqueId val="{00000003-E0A5-4ACF-A496-5C1F173A8A34}"/>
+              </c:ext>
+            </c:extLst>
           </c:dPt>
           <c:cat>
             <c:strRef>
@@ -416,6 +431,11 @@
               </a:ln>
               <a:effectLst/>
             </c:spPr>
+            <c:extLst>
+              <c:ext xmlns:c16="http://schemas.microsoft.com/office/drawing/2014/chart" uri="{C3380CC4-5D6E-409C-BE32-E72D297353CC}">
+                <c16:uniqueId val="{00000001-68F8-4089-98E4-EC92BE7E6C58}"/>
+              </c:ext>
+            </c:extLst>
           </c:dPt>
           <c:dPt>
             <c:idx val="1"/>
@@ -431,6 +451,11 @@
               </a:ln>
               <a:effectLst/>
             </c:spPr>
+            <c:extLst>
+              <c:ext xmlns:c16="http://schemas.microsoft.com/office/drawing/2014/chart" uri="{C3380CC4-5D6E-409C-BE32-E72D297353CC}">
+                <c16:uniqueId val="{00000003-68F8-4089-98E4-EC92BE7E6C58}"/>
+              </c:ext>
+            </c:extLst>
           </c:dPt>
           <c:dPt>
             <c:idx val="2"/>
@@ -446,6 +471,11 @@
               </a:ln>
               <a:effectLst/>
             </c:spPr>
+            <c:extLst>
+              <c:ext xmlns:c16="http://schemas.microsoft.com/office/drawing/2014/chart" uri="{C3380CC4-5D6E-409C-BE32-E72D297353CC}">
+                <c16:uniqueId val="{00000005-68F8-4089-98E4-EC92BE7E6C58}"/>
+              </c:ext>
+            </c:extLst>
           </c:dPt>
           <c:dPt>
             <c:idx val="3"/>
@@ -461,6 +491,11 @@
               </a:ln>
               <a:effectLst/>
             </c:spPr>
+            <c:extLst>
+              <c:ext xmlns:c16="http://schemas.microsoft.com/office/drawing/2014/chart" uri="{C3380CC4-5D6E-409C-BE32-E72D297353CC}">
+                <c16:uniqueId val="{00000007-68F8-4089-98E4-EC92BE7E6C58}"/>
+              </c:ext>
+            </c:extLst>
           </c:dPt>
           <c:dPt>
             <c:idx val="4"/>
@@ -476,6 +511,11 @@
               </a:ln>
               <a:effectLst/>
             </c:spPr>
+            <c:extLst>
+              <c:ext xmlns:c16="http://schemas.microsoft.com/office/drawing/2014/chart" uri="{C3380CC4-5D6E-409C-BE32-E72D297353CC}">
+                <c16:uniqueId val="{00000009-68F8-4089-98E4-EC92BE7E6C58}"/>
+              </c:ext>
+            </c:extLst>
           </c:dPt>
           <c:cat>
             <c:strRef>
@@ -1811,7 +1851,7 @@
           <a:p>
             <a:fld id="{E12D9C4C-9121-4085-B3EA-7F4D0BA9B364}" type="datetimeFigureOut">
               <a:rPr lang="pt-BR" smtClean="0"/>
-              <a:t>29/07/2024</a:t>
+              <a:t>01/08/2024</a:t>
             </a:fld>
             <a:endParaRPr lang="pt-BR"/>
           </a:p>
@@ -2348,7 +2388,7 @@
           <a:p>
             <a:fld id="{25BEFFFA-BAB7-42A8-89B1-EED45F3B1741}" type="datetimeFigureOut">
               <a:rPr lang="pt-BR" smtClean="0"/>
-              <a:t>21/07/2024</a:t>
+              <a:t>01/08/2024</a:t>
             </a:fld>
             <a:endParaRPr lang="pt-BR"/>
           </a:p>
@@ -2623,7 +2663,7 @@
           <a:p>
             <a:fld id="{25BEFFFA-BAB7-42A8-89B1-EED45F3B1741}" type="datetimeFigureOut">
               <a:rPr lang="pt-BR" smtClean="0"/>
-              <a:t>21/07/2024</a:t>
+              <a:t>01/08/2024</a:t>
             </a:fld>
             <a:endParaRPr lang="pt-BR"/>
           </a:p>
@@ -2817,7 +2857,7 @@
           <a:p>
             <a:fld id="{25BEFFFA-BAB7-42A8-89B1-EED45F3B1741}" type="datetimeFigureOut">
               <a:rPr lang="pt-BR" smtClean="0"/>
-              <a:t>21/07/2024</a:t>
+              <a:t>01/08/2024</a:t>
             </a:fld>
             <a:endParaRPr lang="pt-BR"/>
           </a:p>
@@ -3090,7 +3130,7 @@
           <a:p>
             <a:fld id="{25BEFFFA-BAB7-42A8-89B1-EED45F3B1741}" type="datetimeFigureOut">
               <a:rPr lang="pt-BR" smtClean="0"/>
-              <a:t>21/07/2024</a:t>
+              <a:t>01/08/2024</a:t>
             </a:fld>
             <a:endParaRPr lang="pt-BR"/>
           </a:p>
@@ -3431,7 +3471,7 @@
           <a:p>
             <a:fld id="{25BEFFFA-BAB7-42A8-89B1-EED45F3B1741}" type="datetimeFigureOut">
               <a:rPr lang="pt-BR" smtClean="0"/>
-              <a:t>21/07/2024</a:t>
+              <a:t>01/08/2024</a:t>
             </a:fld>
             <a:endParaRPr lang="pt-BR"/>
           </a:p>
@@ -4054,7 +4094,7 @@
           <a:p>
             <a:fld id="{25BEFFFA-BAB7-42A8-89B1-EED45F3B1741}" type="datetimeFigureOut">
               <a:rPr lang="pt-BR" smtClean="0"/>
-              <a:t>21/07/2024</a:t>
+              <a:t>01/08/2024</a:t>
             </a:fld>
             <a:endParaRPr lang="pt-BR"/>
           </a:p>
@@ -4914,7 +4954,7 @@
           <a:p>
             <a:fld id="{25BEFFFA-BAB7-42A8-89B1-EED45F3B1741}" type="datetimeFigureOut">
               <a:rPr lang="pt-BR" smtClean="0"/>
-              <a:t>21/07/2024</a:t>
+              <a:t>01/08/2024</a:t>
             </a:fld>
             <a:endParaRPr lang="pt-BR"/>
           </a:p>
@@ -5084,7 +5124,7 @@
           <a:p>
             <a:fld id="{25BEFFFA-BAB7-42A8-89B1-EED45F3B1741}" type="datetimeFigureOut">
               <a:rPr lang="pt-BR" smtClean="0"/>
-              <a:t>21/07/2024</a:t>
+              <a:t>01/08/2024</a:t>
             </a:fld>
             <a:endParaRPr lang="pt-BR"/>
           </a:p>
@@ -5264,7 +5304,7 @@
           <a:p>
             <a:fld id="{25BEFFFA-BAB7-42A8-89B1-EED45F3B1741}" type="datetimeFigureOut">
               <a:rPr lang="pt-BR" smtClean="0"/>
-              <a:t>21/07/2024</a:t>
+              <a:t>01/08/2024</a:t>
             </a:fld>
             <a:endParaRPr lang="pt-BR"/>
           </a:p>
@@ -5434,7 +5474,7 @@
           <a:p>
             <a:fld id="{25BEFFFA-BAB7-42A8-89B1-EED45F3B1741}" type="datetimeFigureOut">
               <a:rPr lang="pt-BR" smtClean="0"/>
-              <a:t>21/07/2024</a:t>
+              <a:t>01/08/2024</a:t>
             </a:fld>
             <a:endParaRPr lang="pt-BR"/>
           </a:p>
@@ -5681,7 +5721,7 @@
           <a:p>
             <a:fld id="{25BEFFFA-BAB7-42A8-89B1-EED45F3B1741}" type="datetimeFigureOut">
               <a:rPr lang="pt-BR" smtClean="0"/>
-              <a:t>21/07/2024</a:t>
+              <a:t>01/08/2024</a:t>
             </a:fld>
             <a:endParaRPr lang="pt-BR"/>
           </a:p>
@@ -5973,7 +6013,7 @@
           <a:p>
             <a:fld id="{25BEFFFA-BAB7-42A8-89B1-EED45F3B1741}" type="datetimeFigureOut">
               <a:rPr lang="pt-BR" smtClean="0"/>
-              <a:t>21/07/2024</a:t>
+              <a:t>01/08/2024</a:t>
             </a:fld>
             <a:endParaRPr lang="pt-BR"/>
           </a:p>
@@ -6417,7 +6457,7 @@
           <a:p>
             <a:fld id="{25BEFFFA-BAB7-42A8-89B1-EED45F3B1741}" type="datetimeFigureOut">
               <a:rPr lang="pt-BR" smtClean="0"/>
-              <a:t>21/07/2024</a:t>
+              <a:t>01/08/2024</a:t>
             </a:fld>
             <a:endParaRPr lang="pt-BR"/>
           </a:p>
@@ -6535,7 +6575,7 @@
           <a:p>
             <a:fld id="{25BEFFFA-BAB7-42A8-89B1-EED45F3B1741}" type="datetimeFigureOut">
               <a:rPr lang="pt-BR" smtClean="0"/>
-              <a:t>21/07/2024</a:t>
+              <a:t>01/08/2024</a:t>
             </a:fld>
             <a:endParaRPr lang="pt-BR"/>
           </a:p>
@@ -6630,7 +6670,7 @@
           <a:p>
             <a:fld id="{25BEFFFA-BAB7-42A8-89B1-EED45F3B1741}" type="datetimeFigureOut">
               <a:rPr lang="pt-BR" smtClean="0"/>
-              <a:t>21/07/2024</a:t>
+              <a:t>01/08/2024</a:t>
             </a:fld>
             <a:endParaRPr lang="pt-BR"/>
           </a:p>
@@ -6909,7 +6949,7 @@
           <a:p>
             <a:fld id="{25BEFFFA-BAB7-42A8-89B1-EED45F3B1741}" type="datetimeFigureOut">
               <a:rPr lang="pt-BR" smtClean="0"/>
-              <a:t>21/07/2024</a:t>
+              <a:t>01/08/2024</a:t>
             </a:fld>
             <a:endParaRPr lang="pt-BR"/>
           </a:p>
@@ -7184,7 +7224,7 @@
           <a:p>
             <a:fld id="{25BEFFFA-BAB7-42A8-89B1-EED45F3B1741}" type="datetimeFigureOut">
               <a:rPr lang="pt-BR" smtClean="0"/>
-              <a:t>21/07/2024</a:t>
+              <a:t>01/08/2024</a:t>
             </a:fld>
             <a:endParaRPr lang="pt-BR"/>
           </a:p>
@@ -7613,7 +7653,7 @@
           <a:p>
             <a:fld id="{25BEFFFA-BAB7-42A8-89B1-EED45F3B1741}" type="datetimeFigureOut">
               <a:rPr lang="pt-BR" smtClean="0"/>
-              <a:t>21/07/2024</a:t>
+              <a:t>01/08/2024</a:t>
             </a:fld>
             <a:endParaRPr lang="pt-BR"/>
           </a:p>
@@ -9592,7 +9632,30 @@
             <a:pPr lvl="1"/>
             <a:r>
               <a:rPr lang="pt-BR" dirty="0"/>
-              <a:t>Demora 40 </a:t>
+              <a:t>O </a:t>
+            </a:r>
+            <a:r>
+              <a:rPr lang="pt-BR" dirty="0" err="1"/>
+              <a:t>packet</a:t>
+            </a:r>
+            <a:r>
+              <a:rPr lang="pt-BR" dirty="0"/>
+              <a:t> tem 44bytes de tamanho devido ao </a:t>
+            </a:r>
+            <a:r>
+              <a:rPr lang="pt-BR" dirty="0" err="1"/>
+              <a:t>padding</a:t>
+            </a:r>
+            <a:r>
+              <a:rPr lang="pt-BR" dirty="0"/>
+              <a:t> e a organização das variáveis (seria interessante explicar isso?)</a:t>
+            </a:r>
+          </a:p>
+          <a:p>
+            <a:pPr lvl="1"/>
+            <a:r>
+              <a:rPr lang="pt-BR" dirty="0"/>
+              <a:t>Demora 46 </a:t>
             </a:r>
             <a:r>
               <a:rPr lang="pt-BR" dirty="0" err="1"/>

</xml_diff>